<commit_message>
added ppt slide for context
</commit_message>
<xml_diff>
--- a/20 - Data Story Telling/Dog bites on the decline in Louisville.pptx
+++ b/20 - Data Story Telling/Dog bites on the decline in Louisville.pptx
@@ -5,13 +5,14 @@
     <p:sldMasterId id="2147483780" r:id="rId1"/>
   </p:sldMasterIdLst>
   <p:sldIdLst>
-    <p:sldId id="256" r:id="rId2"/>
-    <p:sldId id="257" r:id="rId3"/>
-    <p:sldId id="259" r:id="rId4"/>
+    <p:sldId id="263" r:id="rId2"/>
+    <p:sldId id="256" r:id="rId3"/>
+    <p:sldId id="257" r:id="rId4"/>
     <p:sldId id="260" r:id="rId5"/>
     <p:sldId id="261" r:id="rId6"/>
     <p:sldId id="258" r:id="rId7"/>
     <p:sldId id="262" r:id="rId8"/>
+    <p:sldId id="259" r:id="rId9"/>
   </p:sldIdLst>
   <p:sldSz cx="12192000" cy="6858000"/>
   <p:notesSz cx="6858000" cy="9144000"/>
@@ -3459,7 +3460,7 @@
           <p:cNvPr id="2" name="Title 1">
             <a:extLst>
               <a:ext uri="{FF2B5EF4-FFF2-40B4-BE49-F238E27FC236}">
-                <a16:creationId xmlns:a16="http://schemas.microsoft.com/office/drawing/2014/main" id="{FC2B454D-7C23-4BFA-A2D7-8A0064E2D4CC}"/>
+                <a16:creationId xmlns:a16="http://schemas.microsoft.com/office/drawing/2014/main" id="{C417BEE3-5F45-4D4B-BEB8-B0E19813593F}"/>
               </a:ext>
             </a:extLst>
           </p:cNvPr>
@@ -3467,7 +3468,7 @@
             <a:spLocks noGrp="1"/>
           </p:cNvSpPr>
           <p:nvPr>
-            <p:ph type="ctrTitle"/>
+            <p:ph type="title"/>
           </p:nvPr>
         </p:nvSpPr>
         <p:spPr/>
@@ -3477,17 +3478,17 @@
           <a:p>
             <a:r>
               <a:rPr lang="en-US" dirty="0"/>
-              <a:t>Dog bites on the decline in Louisville</a:t>
-            </a:r>
-          </a:p>
-        </p:txBody>
-      </p:sp>
-      <p:sp>
-        <p:nvSpPr>
-          <p:cNvPr id="3" name="Subtitle 2">
+              <a:t>Set up </a:t>
+            </a:r>
+          </a:p>
+        </p:txBody>
+      </p:sp>
+      <p:sp>
+        <p:nvSpPr>
+          <p:cNvPr id="3" name="Content Placeholder 2">
             <a:extLst>
               <a:ext uri="{FF2B5EF4-FFF2-40B4-BE49-F238E27FC236}">
-                <a16:creationId xmlns:a16="http://schemas.microsoft.com/office/drawing/2014/main" id="{693E8883-A00D-46D8-B068-79A5BE220240}"/>
+                <a16:creationId xmlns:a16="http://schemas.microsoft.com/office/drawing/2014/main" id="{FB366B06-7DF6-4C2B-8265-1514F88425F8}"/>
               </a:ext>
             </a:extLst>
           </p:cNvPr>
@@ -3495,17 +3496,81 @@
             <a:spLocks noGrp="1"/>
           </p:cNvSpPr>
           <p:nvPr>
-            <p:ph type="subTitle" idx="1"/>
+            <p:ph idx="1"/>
           </p:nvPr>
         </p:nvSpPr>
         <p:spPr/>
         <p:txBody>
-          <a:bodyPr/>
+          <a:bodyPr>
+            <a:normAutofit/>
+          </a:bodyPr>
           <a:lstStyle/>
           <a:p>
             <a:r>
               <a:rPr lang="en-US" dirty="0"/>
-              <a:t>Blaine Murphy</a:t>
+              <a:t>Situation: I work for the mayor’s office in the city of Louisville and they need to make a public statement in response to a number of recent dog bite incidents in the city.  </a:t>
+            </a:r>
+          </a:p>
+          <a:p>
+            <a:r>
+              <a:rPr lang="en-US" dirty="0"/>
+              <a:t>Questions under consideration</a:t>
+            </a:r>
+          </a:p>
+          <a:p>
+            <a:pPr lvl="1"/>
+            <a:r>
+              <a:rPr lang="en-US" sz="1400" i="1" dirty="0"/>
+              <a:t>Are the number of dog bites increasing, decreasing, or staying the same?</a:t>
+            </a:r>
+          </a:p>
+          <a:p>
+            <a:pPr lvl="1"/>
+            <a:r>
+              <a:rPr lang="en-US" sz="1400" i="1" dirty="0"/>
+              <a:t>And how does that compare to the number of dogs or rate of dog ownership in the US?</a:t>
+            </a:r>
+          </a:p>
+          <a:p>
+            <a:pPr lvl="1"/>
+            <a:r>
+              <a:rPr lang="en-US" sz="1400" i="1" dirty="0"/>
+              <a:t>Are you more likely to be bitten by a male dog or a female dog?</a:t>
+            </a:r>
+          </a:p>
+          <a:p>
+            <a:pPr lvl="1"/>
+            <a:r>
+              <a:rPr lang="en-US" sz="1400" i="1" dirty="0"/>
+              <a:t>Are dog bites concentrated in certain geographic areas?</a:t>
+            </a:r>
+          </a:p>
+          <a:p>
+            <a:pPr lvl="1"/>
+            <a:r>
+              <a:rPr lang="en-US" sz="1400" i="1" dirty="0"/>
+              <a:t>Which breed of dog are you most likely to be bitten by?</a:t>
+            </a:r>
+          </a:p>
+          <a:p>
+            <a:pPr lvl="1"/>
+            <a:r>
+              <a:rPr lang="en-US" sz="1400" i="1" dirty="0"/>
+              <a:t>I once lived in an apartment where certain dogs were not allowed.  Are they actually a greater risk for biting people?</a:t>
+            </a:r>
+          </a:p>
+          <a:p>
+            <a:pPr lvl="1"/>
+            <a:r>
+              <a:rPr lang="en-US" sz="1400" i="1" dirty="0"/>
+              <a:t>Are pit bulls more likely to bite people than other dog breeds?</a:t>
+            </a:r>
+          </a:p>
+          <a:p>
+            <a:pPr lvl="1"/>
+            <a:r>
+              <a:rPr lang="en-US" sz="1400" i="1" dirty="0"/>
+              <a:t>What are the chances you will get rabies from a dog bite?</a:t>
             </a:r>
           </a:p>
         </p:txBody>
@@ -3513,7 +3578,7 @@
     </p:spTree>
     <p:extLst>
       <p:ext uri="{BB962C8B-B14F-4D97-AF65-F5344CB8AC3E}">
-        <p14:creationId xmlns:p14="http://schemas.microsoft.com/office/powerpoint/2010/main" val="523053604"/>
+        <p14:creationId xmlns:p14="http://schemas.microsoft.com/office/powerpoint/2010/main" val="596984762"/>
       </p:ext>
     </p:extLst>
   </p:cSld>
@@ -3545,6 +3610,92 @@
           <p:cNvPr id="2" name="Title 1">
             <a:extLst>
               <a:ext uri="{FF2B5EF4-FFF2-40B4-BE49-F238E27FC236}">
+                <a16:creationId xmlns:a16="http://schemas.microsoft.com/office/drawing/2014/main" id="{FC2B454D-7C23-4BFA-A2D7-8A0064E2D4CC}"/>
+              </a:ext>
+            </a:extLst>
+          </p:cNvPr>
+          <p:cNvSpPr>
+            <a:spLocks noGrp="1"/>
+          </p:cNvSpPr>
+          <p:nvPr>
+            <p:ph type="ctrTitle"/>
+          </p:nvPr>
+        </p:nvSpPr>
+        <p:spPr/>
+        <p:txBody>
+          <a:bodyPr/>
+          <a:lstStyle/>
+          <a:p>
+            <a:r>
+              <a:rPr lang="en-US" dirty="0"/>
+              <a:t>Dog bites on the decline in Louisville</a:t>
+            </a:r>
+          </a:p>
+        </p:txBody>
+      </p:sp>
+      <p:sp>
+        <p:nvSpPr>
+          <p:cNvPr id="3" name="Subtitle 2">
+            <a:extLst>
+              <a:ext uri="{FF2B5EF4-FFF2-40B4-BE49-F238E27FC236}">
+                <a16:creationId xmlns:a16="http://schemas.microsoft.com/office/drawing/2014/main" id="{693E8883-A00D-46D8-B068-79A5BE220240}"/>
+              </a:ext>
+            </a:extLst>
+          </p:cNvPr>
+          <p:cNvSpPr>
+            <a:spLocks noGrp="1"/>
+          </p:cNvSpPr>
+          <p:nvPr>
+            <p:ph type="subTitle" idx="1"/>
+          </p:nvPr>
+        </p:nvSpPr>
+        <p:spPr/>
+        <p:txBody>
+          <a:bodyPr/>
+          <a:lstStyle/>
+          <a:p>
+            <a:r>
+              <a:rPr lang="en-US" dirty="0"/>
+              <a:t>Blaine Murphy</a:t>
+            </a:r>
+          </a:p>
+        </p:txBody>
+      </p:sp>
+    </p:spTree>
+    <p:extLst>
+      <p:ext uri="{BB962C8B-B14F-4D97-AF65-F5344CB8AC3E}">
+        <p14:creationId xmlns:p14="http://schemas.microsoft.com/office/powerpoint/2010/main" val="523053604"/>
+      </p:ext>
+    </p:extLst>
+  </p:cSld>
+  <p:clrMapOvr>
+    <a:masterClrMapping/>
+  </p:clrMapOvr>
+</p:sld>
+</file>
+
+<file path=ppt/slides/slide3.xml><?xml version="1.0" encoding="utf-8"?>
+<p:sld xmlns:a="http://schemas.openxmlformats.org/drawingml/2006/main" xmlns:r="http://schemas.openxmlformats.org/officeDocument/2006/relationships" xmlns:p="http://schemas.openxmlformats.org/presentationml/2006/main">
+  <p:cSld>
+    <p:spTree>
+      <p:nvGrpSpPr>
+        <p:cNvPr id="1" name=""/>
+        <p:cNvGrpSpPr/>
+        <p:nvPr/>
+      </p:nvGrpSpPr>
+      <p:grpSpPr>
+        <a:xfrm>
+          <a:off x="0" y="0"/>
+          <a:ext cx="0" cy="0"/>
+          <a:chOff x="0" y="0"/>
+          <a:chExt cx="0" cy="0"/>
+        </a:xfrm>
+      </p:grpSpPr>
+      <p:sp>
+        <p:nvSpPr>
+          <p:cNvPr id="2" name="Title 1">
+            <a:extLst>
+              <a:ext uri="{FF2B5EF4-FFF2-40B4-BE49-F238E27FC236}">
                 <a16:creationId xmlns:a16="http://schemas.microsoft.com/office/drawing/2014/main" id="{27BDD277-A00F-45BB-BDB0-40CC931557B1}"/>
               </a:ext>
             </a:extLst>
@@ -3607,150 +3758,6 @@
     <p:extLst>
       <p:ext uri="{BB962C8B-B14F-4D97-AF65-F5344CB8AC3E}">
         <p14:creationId xmlns:p14="http://schemas.microsoft.com/office/powerpoint/2010/main" val="3510925579"/>
-      </p:ext>
-    </p:extLst>
-  </p:cSld>
-  <p:clrMapOvr>
-    <a:masterClrMapping/>
-  </p:clrMapOvr>
-</p:sld>
-</file>
-
-<file path=ppt/slides/slide3.xml><?xml version="1.0" encoding="utf-8"?>
-<p:sld xmlns:a="http://schemas.openxmlformats.org/drawingml/2006/main" xmlns:r="http://schemas.openxmlformats.org/officeDocument/2006/relationships" xmlns:p="http://schemas.openxmlformats.org/presentationml/2006/main" show="0">
-  <p:cSld>
-    <p:spTree>
-      <p:nvGrpSpPr>
-        <p:cNvPr id="1" name=""/>
-        <p:cNvGrpSpPr/>
-        <p:nvPr/>
-      </p:nvGrpSpPr>
-      <p:grpSpPr>
-        <a:xfrm>
-          <a:off x="0" y="0"/>
-          <a:ext cx="0" cy="0"/>
-          <a:chOff x="0" y="0"/>
-          <a:chExt cx="0" cy="0"/>
-        </a:xfrm>
-      </p:grpSpPr>
-      <p:sp>
-        <p:nvSpPr>
-          <p:cNvPr id="2" name="Title 1">
-            <a:extLst>
-              <a:ext uri="{FF2B5EF4-FFF2-40B4-BE49-F238E27FC236}">
-                <a16:creationId xmlns:a16="http://schemas.microsoft.com/office/drawing/2014/main" id="{32F30C58-B1C9-4016-BE32-03782C75CCE0}"/>
-              </a:ext>
-            </a:extLst>
-          </p:cNvPr>
-          <p:cNvSpPr>
-            <a:spLocks noGrp="1"/>
-          </p:cNvSpPr>
-          <p:nvPr>
-            <p:ph type="title"/>
-          </p:nvPr>
-        </p:nvSpPr>
-        <p:spPr/>
-        <p:txBody>
-          <a:bodyPr>
-            <a:normAutofit/>
-          </a:bodyPr>
-          <a:lstStyle/>
-          <a:p>
-            <a:r>
-              <a:rPr lang="en-US" dirty="0"/>
-              <a:t>To reduce risk, exercise caution around dangerous breeds</a:t>
-            </a:r>
-          </a:p>
-        </p:txBody>
-      </p:sp>
-      <p:pic>
-        <p:nvPicPr>
-          <p:cNvPr id="1032" name="Picture 8">
-            <a:extLst>
-              <a:ext uri="{FF2B5EF4-FFF2-40B4-BE49-F238E27FC236}">
-                <a16:creationId xmlns:a16="http://schemas.microsoft.com/office/drawing/2014/main" id="{555DF430-C16D-4E29-B9FF-2528D2258DC7}"/>
-              </a:ext>
-            </a:extLst>
-          </p:cNvPr>
-          <p:cNvPicPr>
-            <a:picLocks noGrp="1" noChangeAspect="1" noChangeArrowheads="1"/>
-          </p:cNvPicPr>
-          <p:nvPr>
-            <p:ph idx="1"/>
-          </p:nvPr>
-        </p:nvPicPr>
-        <p:blipFill>
-          <a:blip r:embed="rId2">
-            <a:extLst>
-              <a:ext uri="{28A0092B-C50C-407E-A947-70E740481C1C}">
-                <a14:useLocalDpi xmlns:a14="http://schemas.microsoft.com/office/drawing/2010/main" val="0"/>
-              </a:ext>
-            </a:extLst>
-          </a:blip>
-          <a:srcRect/>
-          <a:stretch>
-            <a:fillRect/>
-          </a:stretch>
-        </p:blipFill>
-        <p:spPr bwMode="auto">
-          <a:xfrm>
-            <a:off x="2815665" y="1828800"/>
-            <a:ext cx="5487521" cy="4351338"/>
-          </a:xfrm>
-          <a:prstGeom prst="rect">
-            <a:avLst/>
-          </a:prstGeom>
-          <a:noFill/>
-          <a:extLst>
-            <a:ext uri="{909E8E84-426E-40DD-AFC4-6F175D3DCCD1}">
-              <a14:hiddenFill xmlns:a14="http://schemas.microsoft.com/office/drawing/2010/main">
-                <a:solidFill>
-                  <a:srgbClr val="FFFFFF"/>
-                </a:solidFill>
-              </a14:hiddenFill>
-            </a:ext>
-          </a:extLst>
-        </p:spPr>
-      </p:pic>
-      <p:sp>
-        <p:nvSpPr>
-          <p:cNvPr id="5" name="TextBox 4">
-            <a:extLst>
-              <a:ext uri="{FF2B5EF4-FFF2-40B4-BE49-F238E27FC236}">
-                <a16:creationId xmlns:a16="http://schemas.microsoft.com/office/drawing/2014/main" id="{1C4203CE-373F-4A2A-B33D-93C1CEBA471B}"/>
-              </a:ext>
-            </a:extLst>
-          </p:cNvPr>
-          <p:cNvSpPr txBox="1"/>
-          <p:nvPr/>
-        </p:nvSpPr>
-        <p:spPr>
-          <a:xfrm>
-            <a:off x="9116314" y="4468483"/>
-            <a:ext cx="1875546" cy="1477328"/>
-          </a:xfrm>
-          <a:prstGeom prst="rect">
-            <a:avLst/>
-          </a:prstGeom>
-          <a:noFill/>
-        </p:spPr>
-        <p:txBody>
-          <a:bodyPr wrap="square" rtlCol="0">
-            <a:spAutoFit/>
-          </a:bodyPr>
-          <a:lstStyle/>
-          <a:p>
-            <a:r>
-              <a:rPr lang="en-US" i="1" dirty="0"/>
-              <a:t>The chance of getting rabies following a dog bite is only 0.014%!</a:t>
-            </a:r>
-          </a:p>
-        </p:txBody>
-      </p:sp>
-    </p:spTree>
-    <p:extLst>
-      <p:ext uri="{BB962C8B-B14F-4D97-AF65-F5344CB8AC3E}">
-        <p14:creationId xmlns:p14="http://schemas.microsoft.com/office/powerpoint/2010/main" val="2692753252"/>
       </p:ext>
     </p:extLst>
   </p:cSld>
@@ -4544,6 +4551,150 @@
     <p:extLst>
       <p:ext uri="{BB962C8B-B14F-4D97-AF65-F5344CB8AC3E}">
         <p14:creationId xmlns:p14="http://schemas.microsoft.com/office/powerpoint/2010/main" val="2493930354"/>
+      </p:ext>
+    </p:extLst>
+  </p:cSld>
+  <p:clrMapOvr>
+    <a:masterClrMapping/>
+  </p:clrMapOvr>
+</p:sld>
+</file>
+
+<file path=ppt/slides/slide8.xml><?xml version="1.0" encoding="utf-8"?>
+<p:sld xmlns:a="http://schemas.openxmlformats.org/drawingml/2006/main" xmlns:r="http://schemas.openxmlformats.org/officeDocument/2006/relationships" xmlns:p="http://schemas.openxmlformats.org/presentationml/2006/main" show="0">
+  <p:cSld>
+    <p:spTree>
+      <p:nvGrpSpPr>
+        <p:cNvPr id="1" name=""/>
+        <p:cNvGrpSpPr/>
+        <p:nvPr/>
+      </p:nvGrpSpPr>
+      <p:grpSpPr>
+        <a:xfrm>
+          <a:off x="0" y="0"/>
+          <a:ext cx="0" cy="0"/>
+          <a:chOff x="0" y="0"/>
+          <a:chExt cx="0" cy="0"/>
+        </a:xfrm>
+      </p:grpSpPr>
+      <p:sp>
+        <p:nvSpPr>
+          <p:cNvPr id="2" name="Title 1">
+            <a:extLst>
+              <a:ext uri="{FF2B5EF4-FFF2-40B4-BE49-F238E27FC236}">
+                <a16:creationId xmlns:a16="http://schemas.microsoft.com/office/drawing/2014/main" id="{32F30C58-B1C9-4016-BE32-03782C75CCE0}"/>
+              </a:ext>
+            </a:extLst>
+          </p:cNvPr>
+          <p:cNvSpPr>
+            <a:spLocks noGrp="1"/>
+          </p:cNvSpPr>
+          <p:nvPr>
+            <p:ph type="title"/>
+          </p:nvPr>
+        </p:nvSpPr>
+        <p:spPr/>
+        <p:txBody>
+          <a:bodyPr>
+            <a:normAutofit/>
+          </a:bodyPr>
+          <a:lstStyle/>
+          <a:p>
+            <a:r>
+              <a:rPr lang="en-US" dirty="0"/>
+              <a:t>To reduce risk, exercise caution around dangerous breeds</a:t>
+            </a:r>
+          </a:p>
+        </p:txBody>
+      </p:sp>
+      <p:pic>
+        <p:nvPicPr>
+          <p:cNvPr id="1032" name="Picture 8">
+            <a:extLst>
+              <a:ext uri="{FF2B5EF4-FFF2-40B4-BE49-F238E27FC236}">
+                <a16:creationId xmlns:a16="http://schemas.microsoft.com/office/drawing/2014/main" id="{555DF430-C16D-4E29-B9FF-2528D2258DC7}"/>
+              </a:ext>
+            </a:extLst>
+          </p:cNvPr>
+          <p:cNvPicPr>
+            <a:picLocks noGrp="1" noChangeAspect="1" noChangeArrowheads="1"/>
+          </p:cNvPicPr>
+          <p:nvPr>
+            <p:ph idx="1"/>
+          </p:nvPr>
+        </p:nvPicPr>
+        <p:blipFill>
+          <a:blip r:embed="rId2">
+            <a:extLst>
+              <a:ext uri="{28A0092B-C50C-407E-A947-70E740481C1C}">
+                <a14:useLocalDpi xmlns:a14="http://schemas.microsoft.com/office/drawing/2010/main" val="0"/>
+              </a:ext>
+            </a:extLst>
+          </a:blip>
+          <a:srcRect/>
+          <a:stretch>
+            <a:fillRect/>
+          </a:stretch>
+        </p:blipFill>
+        <p:spPr bwMode="auto">
+          <a:xfrm>
+            <a:off x="2815665" y="1828800"/>
+            <a:ext cx="5487521" cy="4351338"/>
+          </a:xfrm>
+          <a:prstGeom prst="rect">
+            <a:avLst/>
+          </a:prstGeom>
+          <a:noFill/>
+          <a:extLst>
+            <a:ext uri="{909E8E84-426E-40DD-AFC4-6F175D3DCCD1}">
+              <a14:hiddenFill xmlns:a14="http://schemas.microsoft.com/office/drawing/2010/main">
+                <a:solidFill>
+                  <a:srgbClr val="FFFFFF"/>
+                </a:solidFill>
+              </a14:hiddenFill>
+            </a:ext>
+          </a:extLst>
+        </p:spPr>
+      </p:pic>
+      <p:sp>
+        <p:nvSpPr>
+          <p:cNvPr id="5" name="TextBox 4">
+            <a:extLst>
+              <a:ext uri="{FF2B5EF4-FFF2-40B4-BE49-F238E27FC236}">
+                <a16:creationId xmlns:a16="http://schemas.microsoft.com/office/drawing/2014/main" id="{1C4203CE-373F-4A2A-B33D-93C1CEBA471B}"/>
+              </a:ext>
+            </a:extLst>
+          </p:cNvPr>
+          <p:cNvSpPr txBox="1"/>
+          <p:nvPr/>
+        </p:nvSpPr>
+        <p:spPr>
+          <a:xfrm>
+            <a:off x="9116314" y="4468483"/>
+            <a:ext cx="1875546" cy="1477328"/>
+          </a:xfrm>
+          <a:prstGeom prst="rect">
+            <a:avLst/>
+          </a:prstGeom>
+          <a:noFill/>
+        </p:spPr>
+        <p:txBody>
+          <a:bodyPr wrap="square" rtlCol="0">
+            <a:spAutoFit/>
+          </a:bodyPr>
+          <a:lstStyle/>
+          <a:p>
+            <a:r>
+              <a:rPr lang="en-US" i="1" dirty="0"/>
+              <a:t>The chance of getting rabies following a dog bite is only 0.014%!</a:t>
+            </a:r>
+          </a:p>
+        </p:txBody>
+      </p:sp>
+    </p:spTree>
+    <p:extLst>
+      <p:ext uri="{BB962C8B-B14F-4D97-AF65-F5344CB8AC3E}">
+        <p14:creationId xmlns:p14="http://schemas.microsoft.com/office/powerpoint/2010/main" val="2692753252"/>
       </p:ext>
     </p:extLst>
   </p:cSld>

</xml_diff>